<commit_message>
A few minor corections the most important being the variable count for the cnf formula at time s0 during StripsToSatPlan explaination
</commit_message>
<xml_diff>
--- a/NaivePlanner/Slides.pptx
+++ b/NaivePlanner/Slides.pptx
@@ -4604,7 +4604,7 @@
         <p:spPr>
           <a:xfrm>
             <a:off x="781050" y="4924425"/>
-            <a:ext cx="3414012" cy="1477328"/>
+            <a:ext cx="3663439" cy="1477328"/>
           </a:xfrm>
           <a:prstGeom prst="rect">
             <a:avLst/>
@@ -4646,7 +4646,7 @@
             </a:br>
             <a:r>
               <a:rPr lang="en-US" dirty="0"/>
-              <a:t>So we need add another time step</a:t>
+              <a:t>So we need to add another time step</a:t>
             </a:r>
           </a:p>
         </p:txBody>
@@ -7049,7 +7049,7 @@
         <p:spPr>
           <a:xfrm>
             <a:off x="520960" y="838899"/>
-            <a:ext cx="11150080" cy="6186309"/>
+            <a:ext cx="11150080" cy="6740307"/>
           </a:xfrm>
           <a:prstGeom prst="rect">
             <a:avLst/>
@@ -7188,6 +7188,40 @@
               <a:rPr lang="en-US" dirty="0"/>
               <a:t>A way to systematically translate the planning problem represented in the PDDL files into a CNF formula</a:t>
             </a:r>
+          </a:p>
+          <a:p>
+            <a:pPr marL="800100" lvl="1" indent="-342900">
+              <a:buFont typeface="+mj-lt"/>
+              <a:buAutoNum type="alphaUcPeriod"/>
+            </a:pPr>
+            <a:r>
+              <a:rPr lang="en-US" dirty="0"/>
+              <a:t>STRIPS To </a:t>
+            </a:r>
+            <a:r>
+              <a:rPr lang="en-US" dirty="0" err="1"/>
+              <a:t>SatPlan</a:t>
+            </a:r>
+            <a:endParaRPr lang="en-US" dirty="0"/>
+          </a:p>
+          <a:p>
+            <a:pPr marL="800100" lvl="1" indent="-342900">
+              <a:buFont typeface="+mj-lt"/>
+              <a:buAutoNum type="alphaUcPeriod"/>
+            </a:pPr>
+            <a:r>
+              <a:rPr lang="en-US" dirty="0" err="1"/>
+              <a:t>Graphplan</a:t>
+            </a:r>
+            <a:r>
+              <a:rPr lang="en-US" dirty="0"/>
+              <a:t> To </a:t>
+            </a:r>
+            <a:r>
+              <a:rPr lang="en-US" dirty="0" err="1"/>
+              <a:t>SatPlan</a:t>
+            </a:r>
+            <a:endParaRPr lang="en-US" dirty="0"/>
           </a:p>
           <a:p>
             <a:pPr marL="342900" indent="-342900">
@@ -10267,7 +10301,7 @@
             </a:r>
             <a:r>
               <a:rPr lang="en-US" dirty="0"/>
-              <a:t> system 1992 which solves planning as propositional satisfiability.</a:t>
+              <a:t> system (1992) which solves planning as propositional satisfiability.</a:t>
             </a:r>
           </a:p>
           <a:p>
@@ -11096,6 +11130,162 @@
             <a:r>
               <a:rPr lang="en-US" dirty="0"/>
               <a:t>We stop here because all the goal facts are present in S2 and have no mutex edges between them which is called the set-level heuristic</a:t>
+            </a:r>
+          </a:p>
+        </p:txBody>
+      </p:sp>
+      <p:sp>
+        <p:nvSpPr>
+          <p:cNvPr id="5" name="Rectangle 4">
+            <a:extLst>
+              <a:ext uri="{FF2B5EF4-FFF2-40B4-BE49-F238E27FC236}">
+                <a16:creationId xmlns:a16="http://schemas.microsoft.com/office/drawing/2014/main" id="{5CB2E878-7C91-4F9C-B50D-8E1A825384CE}"/>
+              </a:ext>
+            </a:extLst>
+          </p:cNvPr>
+          <p:cNvSpPr/>
+          <p:nvPr/>
+        </p:nvSpPr>
+        <p:spPr>
+          <a:xfrm>
+            <a:off x="309393" y="3429000"/>
+            <a:ext cx="3058763" cy="3046988"/>
+          </a:xfrm>
+          <a:prstGeom prst="rect">
+            <a:avLst/>
+          </a:prstGeom>
+          <a:ln>
+            <a:solidFill>
+              <a:schemeClr val="tx1"/>
+            </a:solidFill>
+          </a:ln>
+        </p:spPr>
+        <p:txBody>
+          <a:bodyPr wrap="square">
+            <a:spAutoFit/>
+          </a:bodyPr>
+          <a:lstStyle/>
+          <a:p>
+            <a:r>
+              <a:rPr lang="en-US" sz="1200" dirty="0"/>
+              <a:t>Cake And Eat It To Problem:  (STRIPS Variant)</a:t>
+            </a:r>
+          </a:p>
+          <a:p>
+            <a:endParaRPr lang="en-US" sz="1200" dirty="0"/>
+          </a:p>
+          <a:p>
+            <a:r>
+              <a:rPr lang="en-US" sz="1200" dirty="0"/>
+              <a:t>  Initial state : HC ∧ AC’ </a:t>
+            </a:r>
+          </a:p>
+          <a:p>
+            <a:r>
+              <a:rPr lang="en-US" sz="1200" dirty="0"/>
+              <a:t>  Goal State : HC ∧ AC</a:t>
+            </a:r>
+          </a:p>
+          <a:p>
+            <a:endParaRPr lang="en-US" sz="1200" dirty="0"/>
+          </a:p>
+          <a:p>
+            <a:r>
+              <a:rPr lang="en-US" sz="1200" dirty="0"/>
+              <a:t>  Predicates:</a:t>
+            </a:r>
+          </a:p>
+          <a:p>
+            <a:r>
+              <a:rPr lang="en-US" sz="1200" dirty="0"/>
+              <a:t>       HC : </a:t>
+            </a:r>
+            <a:r>
+              <a:rPr lang="en-US" sz="1200" dirty="0" err="1"/>
+              <a:t>HaveCake</a:t>
+            </a:r>
+            <a:r>
+              <a:rPr lang="en-US" sz="1200" dirty="0"/>
+              <a:t>     HC’: </a:t>
+            </a:r>
+            <a:r>
+              <a:rPr lang="en-US" sz="1200" dirty="0" err="1"/>
+              <a:t>NotHaveCake</a:t>
+            </a:r>
+            <a:endParaRPr lang="en-US" sz="1200" dirty="0"/>
+          </a:p>
+          <a:p>
+            <a:r>
+              <a:rPr lang="en-US" sz="1200" dirty="0"/>
+              <a:t>       AC : </a:t>
+            </a:r>
+            <a:r>
+              <a:rPr lang="en-US" sz="1200" dirty="0" err="1"/>
+              <a:t>AteCake</a:t>
+            </a:r>
+            <a:r>
+              <a:rPr lang="en-US" sz="1200" dirty="0"/>
+              <a:t>        AC’ : </a:t>
+            </a:r>
+            <a:r>
+              <a:rPr lang="en-US" sz="1200" dirty="0" err="1"/>
+              <a:t>NotAteCake</a:t>
+            </a:r>
+            <a:endParaRPr lang="en-US" sz="1200" dirty="0"/>
+          </a:p>
+          <a:p>
+            <a:endParaRPr lang="en-US" sz="1200" dirty="0"/>
+          </a:p>
+          <a:p>
+            <a:r>
+              <a:rPr lang="en-US" sz="1200" dirty="0"/>
+              <a:t>  Actions :</a:t>
+            </a:r>
+          </a:p>
+          <a:p>
+            <a:r>
+              <a:rPr lang="en-US" sz="1200" dirty="0"/>
+              <a:t>       EC : </a:t>
+            </a:r>
+            <a:r>
+              <a:rPr lang="en-US" sz="1200" dirty="0" err="1"/>
+              <a:t>EatCake</a:t>
+            </a:r>
+            <a:endParaRPr lang="en-US" sz="1200" dirty="0"/>
+          </a:p>
+          <a:p>
+            <a:r>
+              <a:rPr lang="en-US" sz="1200" dirty="0"/>
+              <a:t>                 Preconditions : HC</a:t>
+            </a:r>
+          </a:p>
+          <a:p>
+            <a:r>
+              <a:rPr lang="en-US" sz="1200" dirty="0"/>
+              <a:t>                 Effects : HC’ ∧ AC ∧ ¬HC ∧ ¬AC’</a:t>
+            </a:r>
+          </a:p>
+          <a:p>
+            <a:r>
+              <a:rPr lang="en-US" sz="1200" dirty="0"/>
+              <a:t>       BC:  </a:t>
+            </a:r>
+            <a:r>
+              <a:rPr lang="en-US" sz="1200" dirty="0" err="1"/>
+              <a:t>BakeCake</a:t>
+            </a:r>
+            <a:endParaRPr lang="en-US" sz="1200" dirty="0"/>
+          </a:p>
+          <a:p>
+            <a:r>
+              <a:rPr lang="en-US" sz="1200" dirty="0"/>
+              <a:t>                 Preconditions: HC’</a:t>
+            </a:r>
+          </a:p>
+          <a:p>
+            <a:r>
+              <a:rPr lang="en-US" sz="1200" dirty="0"/>
+              <a:t>                 Effects: HC ∧ ¬HC’</a:t>
             </a:r>
           </a:p>
         </p:txBody>
@@ -13484,8 +13674,8 @@
         </p:nvSpPr>
         <p:spPr>
           <a:xfrm>
-            <a:off x="736904" y="1583129"/>
-            <a:ext cx="1530547" cy="461665"/>
+            <a:off x="694937" y="1583129"/>
+            <a:ext cx="1614481" cy="461665"/>
           </a:xfrm>
           <a:prstGeom prst="rect">
             <a:avLst/>
@@ -13508,7 +13698,7 @@
             </a:br>
             <a:r>
               <a:rPr lang="en-US" sz="1200" dirty="0"/>
-              <a:t>From PDDL Definition</a:t>
+              <a:t>From STRIPS Definition</a:t>
             </a:r>
           </a:p>
         </p:txBody>
@@ -13528,9 +13718,9 @@
         <p:grpSpPr>
           <a:xfrm>
             <a:off x="9778143" y="1533359"/>
-            <a:ext cx="1638299" cy="1022869"/>
+            <a:ext cx="1680267" cy="1022869"/>
             <a:chOff x="9777483" y="796405"/>
-            <a:chExt cx="1638299" cy="1022869"/>
+            <a:chExt cx="1680267" cy="1022869"/>
           </a:xfrm>
         </p:grpSpPr>
         <p:sp>
@@ -13646,8 +13836,8 @@
           </p:nvSpPr>
           <p:spPr>
             <a:xfrm>
-              <a:off x="9885235" y="796405"/>
-              <a:ext cx="1530547" cy="461665"/>
+              <a:off x="9843269" y="796405"/>
+              <a:ext cx="1614481" cy="461665"/>
             </a:xfrm>
             <a:prstGeom prst="rect">
               <a:avLst/>
@@ -13670,7 +13860,7 @@
               </a:br>
               <a:r>
                 <a:rPr lang="en-US" sz="1200" dirty="0"/>
-                <a:t>From PDDL Definition</a:t>
+                <a:t>From STRIPS Definition</a:t>
               </a:r>
             </a:p>
           </p:txBody>
@@ -15273,8 +15463,8 @@
         </p:nvSpPr>
         <p:spPr>
           <a:xfrm>
-            <a:off x="736904" y="1583129"/>
-            <a:ext cx="1530547" cy="461665"/>
+            <a:off x="694937" y="1583129"/>
+            <a:ext cx="1614481" cy="461665"/>
           </a:xfrm>
           <a:prstGeom prst="rect">
             <a:avLst/>
@@ -15297,7 +15487,7 @@
             </a:br>
             <a:r>
               <a:rPr lang="en-US" sz="1200" dirty="0"/>
-              <a:t>From PDDL Definition</a:t>
+              <a:t>From STRIPS Definition</a:t>
             </a:r>
           </a:p>
         </p:txBody>
@@ -15317,9 +15507,9 @@
         <p:grpSpPr>
           <a:xfrm>
             <a:off x="9778143" y="1533359"/>
-            <a:ext cx="1638299" cy="1022869"/>
+            <a:ext cx="1680267" cy="1022869"/>
             <a:chOff x="9777483" y="796405"/>
-            <a:chExt cx="1638299" cy="1022869"/>
+            <a:chExt cx="1680267" cy="1022869"/>
           </a:xfrm>
         </p:grpSpPr>
         <p:sp>
@@ -15435,8 +15625,8 @@
           </p:nvSpPr>
           <p:spPr>
             <a:xfrm>
-              <a:off x="9885235" y="796405"/>
-              <a:ext cx="1530547" cy="461665"/>
+              <a:off x="9843269" y="796405"/>
+              <a:ext cx="1614481" cy="461665"/>
             </a:xfrm>
             <a:prstGeom prst="rect">
               <a:avLst/>
@@ -15459,7 +15649,7 @@
               </a:br>
               <a:r>
                 <a:rPr lang="en-US" sz="1200" dirty="0"/>
-                <a:t>From PDDL Definition</a:t>
+                <a:t>From STRIPS Definition</a:t>
               </a:r>
             </a:p>
           </p:txBody>
@@ -17671,8 +17861,8 @@
         </p:nvSpPr>
         <p:spPr>
           <a:xfrm>
-            <a:off x="736904" y="1583129"/>
-            <a:ext cx="1530547" cy="461665"/>
+            <a:off x="694937" y="1583129"/>
+            <a:ext cx="1614481" cy="461665"/>
           </a:xfrm>
           <a:prstGeom prst="rect">
             <a:avLst/>
@@ -17695,7 +17885,7 @@
             </a:br>
             <a:r>
               <a:rPr lang="en-US" sz="1200" dirty="0"/>
-              <a:t>From PDDL Definition</a:t>
+              <a:t>From STRIPS Definition</a:t>
             </a:r>
           </a:p>
         </p:txBody>
@@ -17715,9 +17905,9 @@
         <p:grpSpPr>
           <a:xfrm>
             <a:off x="9778143" y="1533359"/>
-            <a:ext cx="1638299" cy="1022869"/>
+            <a:ext cx="1680267" cy="1022869"/>
             <a:chOff x="9777483" y="796405"/>
-            <a:chExt cx="1638299" cy="1022869"/>
+            <a:chExt cx="1680267" cy="1022869"/>
           </a:xfrm>
         </p:grpSpPr>
         <p:sp>
@@ -17833,8 +18023,8 @@
           </p:nvSpPr>
           <p:spPr>
             <a:xfrm>
-              <a:off x="9885235" y="796405"/>
-              <a:ext cx="1530547" cy="461665"/>
+              <a:off x="9843269" y="796405"/>
+              <a:ext cx="1614481" cy="461665"/>
             </a:xfrm>
             <a:prstGeom prst="rect">
               <a:avLst/>
@@ -17857,7 +18047,7 @@
               </a:br>
               <a:r>
                 <a:rPr lang="en-US" sz="1200" dirty="0"/>
-                <a:t>From PDDL Definition</a:t>
+                <a:t>From STRIPS Definition</a:t>
               </a:r>
             </a:p>
           </p:txBody>
@@ -19416,7 +19606,10 @@
             </a:r>
           </a:p>
           <a:p>
-            <a:endParaRPr lang="en-US" dirty="0"/>
+            <a:r>
+              <a:rPr lang="en-US" dirty="0"/>
+              <a:t>	</a:t>
+            </a:r>
           </a:p>
           <a:p>
             <a:r>
@@ -20650,7 +20843,7 @@
         </p:blipFill>
         <p:spPr>
           <a:xfrm>
-            <a:off x="8324717" y="4194080"/>
+            <a:off x="8441312" y="4202469"/>
             <a:ext cx="3058763" cy="1911733"/>
           </a:xfrm>
           <a:prstGeom prst="rect">
@@ -20702,7 +20895,7 @@
         </p:nvSpPr>
         <p:spPr>
           <a:xfrm>
-            <a:off x="567361" y="908420"/>
+            <a:off x="624014" y="913763"/>
             <a:ext cx="3058763" cy="3046988"/>
           </a:xfrm>
           <a:prstGeom prst="rect">
@@ -20920,7 +21113,7 @@
             </a:br>
             <a:r>
               <a:rPr lang="en-US" dirty="0"/>
-              <a:t>5 Variables</a:t>
+              <a:t>4 Variables</a:t>
             </a:r>
           </a:p>
           <a:p>

</xml_diff>